<commit_message>
App prog lec 10
</commit_message>
<xml_diff>
--- a/eece2160/sp18/lectures/eece.2160sp18_lec9_range.pptx
+++ b/eece2160/sp18/lectures/eece.2160sp18_lec9_range.pptx
@@ -1331,7 +1331,7 @@
           <a:p>
             <a:fld id="{C2E9D5B8-BFEB-F64B-A53A-EB0FDF33ED1B}" type="datetime1">
               <a:rPr lang="en-US" smtClean="0"/>
-              <a:t>2/12/18</a:t>
+              <a:t>2/14/18</a:t>
             </a:fld>
             <a:endParaRPr lang="en-US"/>
           </a:p>
@@ -1528,7 +1528,7 @@
           <a:p>
             <a:fld id="{CFC2FC5F-51E0-A84A-A46C-4864C7B478D8}" type="datetime1">
               <a:rPr lang="en-US" smtClean="0"/>
-              <a:t>2/12/18</a:t>
+              <a:t>2/14/18</a:t>
             </a:fld>
             <a:endParaRPr lang="en-US"/>
           </a:p>
@@ -1734,7 +1734,7 @@
           <a:p>
             <a:fld id="{4C7ED042-6550-7C43-8C99-F5A5924E1DB5}" type="datetime1">
               <a:rPr lang="en-US" smtClean="0"/>
-              <a:t>2/12/18</a:t>
+              <a:t>2/14/18</a:t>
             </a:fld>
             <a:endParaRPr lang="en-US"/>
           </a:p>
@@ -1997,7 +1997,7 @@
           <a:p>
             <a:fld id="{7931A9CD-B503-A843-8B2E-5D52D7CC7D62}" type="datetime1">
               <a:rPr lang="en-US" smtClean="0"/>
-              <a:t>2/12/18</a:t>
+              <a:t>2/14/18</a:t>
             </a:fld>
             <a:endParaRPr lang="en-US"/>
           </a:p>
@@ -2260,7 +2260,7 @@
           <a:p>
             <a:fld id="{FEAD3B85-DE20-7444-B02A-3A5886204F73}" type="datetime1">
               <a:rPr lang="en-US" smtClean="0"/>
-              <a:t>2/12/18</a:t>
+              <a:t>2/14/18</a:t>
             </a:fld>
             <a:endParaRPr lang="en-US"/>
           </a:p>
@@ -2456,7 +2456,7 @@
           <a:p>
             <a:fld id="{1ACB1FFB-5ABC-2942-A1C5-6FA5E11C7B56}" type="datetime1">
               <a:rPr lang="en-US" smtClean="0"/>
-              <a:t>2/12/18</a:t>
+              <a:t>2/14/18</a:t>
             </a:fld>
             <a:endParaRPr lang="en-US"/>
           </a:p>
@@ -2674,7 +2674,7 @@
           <a:p>
             <a:fld id="{18ADDD7B-9A8C-7148-B245-007A229D128A}" type="datetime1">
               <a:rPr lang="en-US" smtClean="0"/>
-              <a:t>2/12/18</a:t>
+              <a:t>2/14/18</a:t>
             </a:fld>
             <a:endParaRPr lang="en-US"/>
           </a:p>
@@ -2988,7 +2988,7 @@
           <a:p>
             <a:fld id="{AF00F4C5-2244-C44B-8448-AC13FCEFCD06}" type="datetime1">
               <a:rPr lang="en-US" smtClean="0"/>
-              <a:t>2/12/18</a:t>
+              <a:t>2/14/18</a:t>
             </a:fld>
             <a:endParaRPr lang="en-US"/>
           </a:p>
@@ -3441,7 +3441,7 @@
           <a:p>
             <a:fld id="{357029F9-152B-144F-A40B-AF49FB87B6C7}" type="datetime1">
               <a:rPr lang="en-US" smtClean="0"/>
-              <a:t>2/12/18</a:t>
+              <a:t>2/14/18</a:t>
             </a:fld>
             <a:endParaRPr lang="en-US"/>
           </a:p>
@@ -3585,7 +3585,7 @@
           <a:p>
             <a:fld id="{F358536A-834D-6C43-AA51-C0EE2623E3DE}" type="datetime1">
               <a:rPr lang="en-US" smtClean="0"/>
-              <a:t>2/12/18</a:t>
+              <a:t>2/14/18</a:t>
             </a:fld>
             <a:endParaRPr lang="en-US"/>
           </a:p>
@@ -3706,7 +3706,7 @@
           <a:p>
             <a:fld id="{A532CAC8-F563-B445-8FDD-3838955A16B1}" type="datetime1">
               <a:rPr lang="en-US" smtClean="0"/>
-              <a:t>2/12/18</a:t>
+              <a:t>2/14/18</a:t>
             </a:fld>
             <a:endParaRPr lang="en-US"/>
           </a:p>
@@ -4009,7 +4009,7 @@
           <a:p>
             <a:fld id="{B9259050-9725-3B4A-936C-AD79886B6404}" type="datetime1">
               <a:rPr lang="en-US" smtClean="0"/>
-              <a:t>2/12/18</a:t>
+              <a:t>2/14/18</a:t>
             </a:fld>
             <a:endParaRPr lang="en-US"/>
           </a:p>
@@ -4289,7 +4289,7 @@
           <a:p>
             <a:fld id="{546E5599-ADF6-6241-AEA0-20B472003C69}" type="datetime1">
               <a:rPr lang="en-US" smtClean="0"/>
-              <a:t>2/12/18</a:t>
+              <a:t>2/14/18</a:t>
             </a:fld>
             <a:endParaRPr lang="en-US"/>
           </a:p>
@@ -4588,7 +4588,7 @@
           <a:p>
             <a:fld id="{44A07774-E337-3D45-908E-89AA7F5FC122}" type="datetime1">
               <a:rPr lang="en-US" smtClean="0"/>
-              <a:t>2/12/18</a:t>
+              <a:t>2/14/18</a:t>
             </a:fld>
             <a:endParaRPr lang="en-US"/>
           </a:p>
@@ -5980,7 +5980,7 @@
               <a:rPr lang="en-US" smtClean="0">
                 <a:latin typeface="Garamond" charset="0"/>
               </a:rPr>
-              <a:t>2/12/18</a:t>
+              <a:t>2/14/18</a:t>
             </a:fld>
             <a:endParaRPr lang="en-US">
               <a:latin typeface="Garamond" charset="0"/>
@@ -6680,7 +6680,7 @@
               <a:rPr lang="en-US" smtClean="0">
                 <a:latin typeface="Garamond" charset="0"/>
               </a:rPr>
-              <a:t>2/12/18</a:t>
+              <a:t>2/14/18</a:t>
             </a:fld>
             <a:endParaRPr lang="en-US">
               <a:latin typeface="Garamond" charset="0"/>
@@ -7382,7 +7382,7 @@
               <a:rPr lang="en-US" smtClean="0">
                 <a:latin typeface="Garamond" charset="0"/>
               </a:rPr>
-              <a:t>2/12/18</a:t>
+              <a:t>2/14/18</a:t>
             </a:fld>
             <a:endParaRPr lang="en-US">
               <a:latin typeface="Garamond" charset="0"/>
@@ -7874,7 +7874,7 @@
               <a:rPr lang="en-US" smtClean="0">
                 <a:latin typeface="Garamond" charset="0"/>
               </a:rPr>
-              <a:t>2/12/18</a:t>
+              <a:t>2/14/18</a:t>
             </a:fld>
             <a:endParaRPr lang="en-US">
               <a:latin typeface="Garamond" charset="0"/>
@@ -8944,7 +8944,7 @@
               <a:rPr lang="en-US" smtClean="0">
                 <a:latin typeface="Garamond" charset="0"/>
               </a:rPr>
-              <a:t>2/12/18</a:t>
+              <a:t>2/14/18</a:t>
             </a:fld>
             <a:endParaRPr lang="en-US">
               <a:latin typeface="Garamond" charset="0"/>
@@ -9699,7 +9699,7 @@
               <a:rPr lang="en-US" smtClean="0">
                 <a:latin typeface="Garamond" charset="0"/>
               </a:rPr>
-              <a:t>2/12/18</a:t>
+              <a:t>2/14/18</a:t>
             </a:fld>
             <a:endParaRPr lang="en-US">
               <a:latin typeface="Garamond" charset="0"/>
@@ -9969,10 +9969,10 @@
           <a:p>
             <a:pPr lvl="1"/>
             <a:r>
-              <a:rPr lang="en-US" dirty="0" smtClean="0">
-                <a:latin typeface="Arial" charset="0"/>
-              </a:rPr>
-              <a:t>Debugger demonstration</a:t>
+              <a:rPr lang="en-US" smtClean="0">
+                <a:latin typeface="Arial" charset="0"/>
+              </a:rPr>
+              <a:t>While loops</a:t>
             </a:r>
             <a:endParaRPr lang="en-US" dirty="0">
               <a:latin typeface="Arial" charset="0"/>
@@ -10019,7 +10019,7 @@
           <a:p>
             <a:pPr lvl="1"/>
             <a:r>
-              <a:rPr lang="en-US"/>
+              <a:rPr lang="en-US" dirty="0"/>
               <a:t>Looking even further ahead: Exam 3 on Thursday, 5/10, 6:30-9:30 PM</a:t>
             </a:r>
           </a:p>
@@ -10166,7 +10166,7 @@
               <a:rPr lang="en-US" smtClean="0">
                 <a:latin typeface="Garamond" charset="0"/>
               </a:rPr>
-              <a:t>2/12/18</a:t>
+              <a:t>2/14/18</a:t>
             </a:fld>
             <a:endParaRPr lang="en-US">
               <a:latin typeface="Garamond" charset="0"/>
@@ -10676,7 +10676,7 @@
               <a:rPr lang="en-US" smtClean="0">
                 <a:latin typeface="Garamond" charset="0"/>
               </a:rPr>
-              <a:t>2/12/18</a:t>
+              <a:t>2/14/18</a:t>
             </a:fld>
             <a:endParaRPr lang="en-US">
               <a:latin typeface="Garamond" charset="0"/>
@@ -11093,7 +11093,7 @@
           <a:p>
             <a:fld id="{893A5FDF-799F-F141-B655-F2F8151A8271}" type="datetime1">
               <a:rPr lang="en-US" smtClean="0"/>
-              <a:t>2/12/18</a:t>
+              <a:t>2/14/18</a:t>
             </a:fld>
             <a:endParaRPr lang="en-US"/>
           </a:p>
@@ -16479,7 +16479,7 @@
                 <a:latin typeface="Garamond" charset="0"/>
                 <a:cs typeface="Arial" charset="0"/>
               </a:rPr>
-              <a:t>2/12/18</a:t>
+              <a:t>2/14/18</a:t>
             </a:fld>
             <a:endParaRPr lang="en-US" sz="1200">
               <a:latin typeface="Garamond" charset="0"/>
@@ -16812,7 +16812,7 @@
           <a:p>
             <a:fld id="{4C3B055A-50D5-624C-BC30-2E001C11AAA9}" type="datetime1">
               <a:rPr lang="en-US" smtClean="0"/>
-              <a:t>2/12/18</a:t>
+              <a:t>2/14/18</a:t>
             </a:fld>
             <a:endParaRPr lang="en-US"/>
           </a:p>
@@ -17392,7 +17392,7 @@
               <a:rPr lang="en-US" smtClean="0">
                 <a:latin typeface="Garamond" charset="0"/>
               </a:rPr>
-              <a:t>2/12/18</a:t>
+              <a:t>2/14/18</a:t>
             </a:fld>
             <a:endParaRPr lang="en-US">
               <a:latin typeface="Garamond" charset="0"/>
@@ -18076,7 +18076,7 @@
               <a:rPr lang="en-US" smtClean="0">
                 <a:latin typeface="Garamond" charset="0"/>
               </a:rPr>
-              <a:t>2/12/18</a:t>
+              <a:t>2/14/18</a:t>
             </a:fld>
             <a:endParaRPr lang="en-US">
               <a:latin typeface="Garamond" charset="0"/>
@@ -18705,7 +18705,7 @@
               <a:rPr lang="en-US" smtClean="0">
                 <a:latin typeface="Garamond" charset="0"/>
               </a:rPr>
-              <a:t>2/12/18</a:t>
+              <a:t>2/14/18</a:t>
             </a:fld>
             <a:endParaRPr lang="en-US">
               <a:latin typeface="Garamond" charset="0"/>
@@ -19382,7 +19382,7 @@
               <a:rPr lang="en-US" smtClean="0">
                 <a:latin typeface="Garamond" charset="0"/>
               </a:rPr>
-              <a:t>2/12/18</a:t>
+              <a:t>2/14/18</a:t>
             </a:fld>
             <a:endParaRPr lang="en-US">
               <a:latin typeface="Garamond" charset="0"/>

</xml_diff>